<commit_message>
updated with current slides
</commit_message>
<xml_diff>
--- a/slides-ci-with-vagrant.pptx
+++ b/slides-ci-with-vagrant.pptx
@@ -13417,7 +13417,7 @@
               <a:buNone/>
             </a:pPr>
             <a:r>
-              <a:rPr strike="noStrike" u="none" b="0" cap="none" baseline="0" sz="3950" lang="en-US" i="0">
+              <a:rPr strike="noStrike" u="none" b="0" cap="none" baseline="0" sz="4400" lang="en-US" i="0">
                 <a:solidFill>
                   <a:schemeClr val="dk1"/>
                 </a:solidFill>
@@ -13426,7 +13426,7 @@
                 <a:cs typeface="Calibri"/>
                 <a:sym typeface="Calibri"/>
               </a:rPr>
-              <a:t>Vagrant: Remote-controls VirtualBox</a:t>
+              <a:t>Vagrant Boxes For Download</a:t>
             </a:r>
           </a:p>
         </p:txBody>
@@ -13439,8 +13439,8 @@
         </p:nvSpPr>
         <p:spPr>
           <a:xfrm>
-            <a:off y="1650817" x="457200"/>
-            <a:ext cy="4424725" cx="8229599"/>
+            <a:off y="1600200" x="2444872"/>
+            <a:ext cy="4525963" cx="4254254"/>
           </a:xfrm>
           <a:prstGeom prst="rect">
             <a:avLst/>
@@ -13529,7 +13529,7 @@
                 <a:cs typeface="Calibri"/>
                 <a:sym typeface="Calibri"/>
               </a:rPr>
-              <a:t>Vagrant Boxes For Download</a:t>
+              <a:t>Box Install</a:t>
             </a:r>
           </a:p>
         </p:txBody>
@@ -13542,8 +13542,8 @@
         </p:nvSpPr>
         <p:spPr>
           <a:xfrm>
-            <a:off y="1600200" x="2444872"/>
-            <a:ext cy="4525963" cx="4254254"/>
+            <a:off y="1600200" x="2088685"/>
+            <a:ext cy="4525963" cx="4966625"/>
           </a:xfrm>
           <a:prstGeom prst="rect">
             <a:avLst/>
@@ -13623,7 +13623,7 @@
               <a:buNone/>
             </a:pPr>
             <a:r>
-              <a:rPr strike="noStrike" u="none" b="0" cap="none" baseline="0" sz="4400" lang="en-US" i="0">
+              <a:rPr strike="noStrike" u="none" b="0" cap="none" baseline="0" sz="3950" lang="en-US" i="0">
                 <a:solidFill>
                   <a:schemeClr val="dk1"/>
                 </a:solidFill>
@@ -13632,7 +13632,7 @@
                 <a:cs typeface="Calibri"/>
                 <a:sym typeface="Calibri"/>
               </a:rPr>
-              <a:t>Box Install</a:t>
+              <a:t>Vagrant: Remote-controls VirtualBox</a:t>
             </a:r>
           </a:p>
         </p:txBody>
@@ -13645,8 +13645,8 @@
         </p:nvSpPr>
         <p:spPr>
           <a:xfrm>
-            <a:off y="1600200" x="2088685"/>
-            <a:ext cy="4525963" cx="4966625"/>
+            <a:off y="1650817" x="457200"/>
+            <a:ext cy="4424725" cx="8229599"/>
           </a:xfrm>
           <a:prstGeom prst="rect">
             <a:avLst/>
@@ -15560,7 +15560,7 @@
             <a:tbl>
               <a:tblPr firstRow="1" bandRow="1">
                 <a:noFill/>
-                <a:tableStyleId>{30B37E31-44FF-4073-BB39-1599D8AB99F1}</a:tableStyleId>
+                <a:tableStyleId>{DB34C75C-A25F-4B3B-A2BF-281397C389FC}</a:tableStyleId>
               </a:tblPr>
               <a:tblGrid>
                 <a:gridCol w="2057400"/>
@@ -19123,6 +19123,29 @@
             </a:pPr>
             <a:r>
               <a:rPr sz="2000" lang="en-US"/>
+              <a:t>Slides: </a:t>
+            </a:r>
+            <a:r>
+              <a:rPr u="sng" sz="2000" lang="en-US">
+                <a:solidFill>
+                  <a:schemeClr val="hlink"/>
+                </a:solidFill>
+                <a:hlinkClick r:id="rId3"/>
+              </a:rPr>
+              <a:t>https://github.com/mschilli/yapc2013</a:t>
+            </a:r>
+          </a:p>
+          <a:p>
+            <a:pPr rtl="0" lvl="0" indent="-342900" marL="342900">
+              <a:buClr>
+                <a:schemeClr val="dk1"/>
+              </a:buClr>
+              <a:buSzPct val="158333"/>
+              <a:buFont typeface="Arial"/>
+              <a:buChar char="•"/>
+            </a:pPr>
+            <a:r>
+              <a:rPr sz="2000" lang="en-US"/>
               <a:t>Demo code: </a:t>
             </a:r>
             <a:r>
@@ -19130,7 +19153,7 @@
                 <a:solidFill>
                   <a:schemeClr val="hlink"/>
                 </a:solidFill>
-                <a:hlinkClick r:id="rId3"/>
+                <a:hlinkClick r:id="rId4"/>
               </a:rPr>
               <a:t>https://github.com/mschilli/yapc2013/tree/master/yapc2013-cookbook</a:t>
             </a:r>
@@ -19256,7 +19279,7 @@
                 <a:ea typeface="Calibri"/>
                 <a:cs typeface="Calibri"/>
                 <a:sym typeface="Calibri"/>
-                <a:hlinkClick r:id="rId4"/>
+                <a:hlinkClick r:id="rId5"/>
               </a:rPr>
               <a:t>http://www.opscode.com/chef/</a:t>
             </a:r>
@@ -19319,7 +19342,7 @@
                 <a:solidFill>
                   <a:schemeClr val="hlink"/>
                 </a:solidFill>
-                <a:hlinkClick r:id="rId5"/>
+                <a:hlinkClick r:id="rId6"/>
               </a:rPr>
               <a:t>http://docs.opscode.com/</a:t>
             </a:r>
@@ -19345,7 +19368,7 @@
                 <a:solidFill>
                   <a:schemeClr val="hlink"/>
                 </a:solidFill>
-                <a:hlinkClick r:id="rId6"/>
+                <a:hlinkClick r:id="rId7"/>
               </a:rPr>
               <a:t>https://github.com/opscode/test-kitchen</a:t>
             </a:r>
@@ -19371,7 +19394,7 @@
                 <a:solidFill>
                   <a:schemeClr val="hlink"/>
                 </a:solidFill>
-                <a:hlinkClick r:id="rId7"/>
+                <a:hlinkClick r:id="rId8"/>
               </a:rPr>
               <a:t>https://github.com/sstephenson/bats</a:t>
             </a:r>
@@ -21152,283 +21175,6 @@
 </file>
 
 <file path=ppt/theme/theme1.xml><?xml version="1.0" encoding="utf-8"?>
-<a:theme xmlns:a="http://schemas.openxmlformats.org/drawingml/2006/main" xmlns:r="http://schemas.openxmlformats.org/officeDocument/2006/relationships">
-  <a:themeElements>
-    <a:clrScheme name="Office">
-      <a:dk1>
-        <a:srgbClr val="000000"/>
-      </a:dk1>
-      <a:lt1>
-        <a:srgbClr val="FFFFFF"/>
-      </a:lt1>
-      <a:dk2>
-        <a:srgbClr val="1F497D"/>
-      </a:dk2>
-      <a:lt2>
-        <a:srgbClr val="EEECE1"/>
-      </a:lt2>
-      <a:accent1>
-        <a:srgbClr val="4F81BD"/>
-      </a:accent1>
-      <a:accent2>
-        <a:srgbClr val="C0504D"/>
-      </a:accent2>
-      <a:accent3>
-        <a:srgbClr val="9BBB59"/>
-      </a:accent3>
-      <a:accent4>
-        <a:srgbClr val="8064A2"/>
-      </a:accent4>
-      <a:accent5>
-        <a:srgbClr val="4BACC6"/>
-      </a:accent5>
-      <a:accent6>
-        <a:srgbClr val="F79646"/>
-      </a:accent6>
-      <a:hlink>
-        <a:srgbClr val="0000FF"/>
-      </a:hlink>
-      <a:folHlink>
-        <a:srgbClr val="800080"/>
-      </a:folHlink>
-    </a:clrScheme>
-    <a:fontScheme name="Office">
-      <a:majorFont>
-        <a:latin typeface="Arial"/>
-        <a:ea typeface=""/>
-        <a:cs typeface=""/>
-        <a:font typeface="ＭＳ Ｐゴシック" script="Jpan"/>
-        <a:font typeface="맑은 고딕" script="Hang"/>
-        <a:font typeface="宋体" script="Hans"/>
-        <a:font typeface="新細明體" script="Hant"/>
-        <a:font typeface="Times New Roman" script="Arab"/>
-        <a:font typeface="Times New Roman" script="Hebr"/>
-        <a:font typeface="Angsana New" script="Thai"/>
-        <a:font typeface="Nyala" script="Ethi"/>
-        <a:font typeface="Vrinda" script="Beng"/>
-        <a:font typeface="Shruti" script="Gujr"/>
-        <a:font typeface="MoolBoran" script="Khmr"/>
-        <a:font typeface="Tunga" script="Knda"/>
-        <a:font typeface="Raavi" script="Guru"/>
-        <a:font typeface="Euphemia" script="Cans"/>
-        <a:font typeface="Plantagenet Cherokee" script="Cher"/>
-        <a:font typeface="Microsoft Yi Baiti" script="Yiii"/>
-        <a:font typeface="Microsoft Himalaya" script="Tibt"/>
-        <a:font typeface="MV Boli" script="Thaa"/>
-        <a:font typeface="Mangal" script="Deva"/>
-        <a:font typeface="Gautami" script="Telu"/>
-        <a:font typeface="Latha" script="Taml"/>
-        <a:font typeface="Estrangelo Edessa" script="Syrc"/>
-        <a:font typeface="Kalinga" script="Orya"/>
-        <a:font typeface="Kartika" script="Mlym"/>
-        <a:font typeface="DokChampa" script="Laoo"/>
-        <a:font typeface="Iskoola Pota" script="Sinh"/>
-        <a:font typeface="Mongolian Baiti" script="Mong"/>
-        <a:font typeface="Times New Roman" script="Viet"/>
-        <a:font typeface="Microsoft Uighur" script="Uigh"/>
-      </a:majorFont>
-      <a:minorFont>
-        <a:latin typeface="Arial"/>
-        <a:ea typeface=""/>
-        <a:cs typeface=""/>
-        <a:font typeface="ＭＳ Ｐゴシック" script="Jpan"/>
-        <a:font typeface="맑은 고딕" script="Hang"/>
-        <a:font typeface="宋体" script="Hans"/>
-        <a:font typeface="新細明體" script="Hant"/>
-        <a:font typeface="Arial" script="Arab"/>
-        <a:font typeface="Arial" script="Hebr"/>
-        <a:font typeface="Cordia New" script="Thai"/>
-        <a:font typeface="Nyala" script="Ethi"/>
-        <a:font typeface="Vrinda" script="Beng"/>
-        <a:font typeface="Shruti" script="Gujr"/>
-        <a:font typeface="DaunPenh" script="Khmr"/>
-        <a:font typeface="Tunga" script="Knda"/>
-        <a:font typeface="Raavi" script="Guru"/>
-        <a:font typeface="Euphemia" script="Cans"/>
-        <a:font typeface="Plantagenet Cherokee" script="Cher"/>
-        <a:font typeface="Microsoft Yi Baiti" script="Yiii"/>
-        <a:font typeface="Microsoft Himalaya" script="Tibt"/>
-        <a:font typeface="MV Boli" script="Thaa"/>
-        <a:font typeface="Mangal" script="Deva"/>
-        <a:font typeface="Gautami" script="Telu"/>
-        <a:font typeface="Latha" script="Taml"/>
-        <a:font typeface="Estrangelo Edessa" script="Syrc"/>
-        <a:font typeface="Kalinga" script="Orya"/>
-        <a:font typeface="Kartika" script="Mlym"/>
-        <a:font typeface="DokChampa" script="Laoo"/>
-        <a:font typeface="Iskoola Pota" script="Sinh"/>
-        <a:font typeface="Mongolian Baiti" script="Mong"/>
-        <a:font typeface="Arial" script="Viet"/>
-        <a:font typeface="Microsoft Uighur" script="Uigh"/>
-      </a:minorFont>
-    </a:fontScheme>
-    <a:fmtScheme name="Office">
-      <a:fillStyleLst>
-        <a:solidFill>
-          <a:schemeClr val="phClr"/>
-        </a:solidFill>
-        <a:gradFill rotWithShape="1">
-          <a:gsLst>
-            <a:gs pos="0">
-              <a:schemeClr val="phClr">
-                <a:tint val="50000"/>
-                <a:satMod val="300000"/>
-              </a:schemeClr>
-            </a:gs>
-            <a:gs pos="35000">
-              <a:schemeClr val="phClr">
-                <a:tint val="37000"/>
-                <a:satMod val="300000"/>
-              </a:schemeClr>
-            </a:gs>
-            <a:gs pos="100000">
-              <a:schemeClr val="phClr">
-                <a:tint val="15000"/>
-                <a:satMod val="350000"/>
-              </a:schemeClr>
-            </a:gs>
-          </a:gsLst>
-          <a:lin ang="16200000" scaled="1"/>
-        </a:gradFill>
-        <a:gradFill rotWithShape="1">
-          <a:gsLst>
-            <a:gs pos="0">
-              <a:schemeClr val="phClr">
-                <a:tint val="100000"/>
-                <a:shade val="100000"/>
-                <a:satMod val="130000"/>
-              </a:schemeClr>
-            </a:gs>
-            <a:gs pos="100000">
-              <a:schemeClr val="phClr">
-                <a:tint val="50000"/>
-                <a:shade val="100000"/>
-                <a:satMod val="350000"/>
-              </a:schemeClr>
-            </a:gs>
-          </a:gsLst>
-          <a:lin ang="16200000" scaled="0"/>
-        </a:gradFill>
-      </a:fillStyleLst>
-      <a:lnStyleLst>
-        <a:ln w="9525" algn="ctr" cap="flat" cmpd="sng">
-          <a:solidFill>
-            <a:schemeClr val="phClr">
-              <a:shade val="95000"/>
-              <a:satMod val="105000"/>
-            </a:schemeClr>
-          </a:solidFill>
-          <a:prstDash val="solid"/>
-        </a:ln>
-        <a:ln w="25400" algn="ctr" cap="flat" cmpd="sng">
-          <a:solidFill>
-            <a:schemeClr val="phClr"/>
-          </a:solidFill>
-          <a:prstDash val="solid"/>
-        </a:ln>
-        <a:ln w="38100" algn="ctr" cap="flat" cmpd="sng">
-          <a:solidFill>
-            <a:schemeClr val="phClr"/>
-          </a:solidFill>
-          <a:prstDash val="solid"/>
-        </a:ln>
-      </a:lnStyleLst>
-      <a:effectStyleLst>
-        <a:effectStyle>
-          <a:effectLst>
-            <a:outerShdw rotWithShape="0" dir="5400000" blurRad="40000" dist="20000">
-              <a:srgbClr val="000000">
-                <a:alpha val="38000"/>
-              </a:srgbClr>
-            </a:outerShdw>
-          </a:effectLst>
-        </a:effectStyle>
-        <a:effectStyle>
-          <a:effectLst>
-            <a:outerShdw rotWithShape="0" dir="5400000" blurRad="40000" dist="23000">
-              <a:srgbClr val="000000">
-                <a:alpha val="35000"/>
-              </a:srgbClr>
-            </a:outerShdw>
-          </a:effectLst>
-        </a:effectStyle>
-        <a:effectStyle>
-          <a:effectLst>
-            <a:outerShdw rotWithShape="0" dir="5400000" blurRad="40000" dist="23000">
-              <a:srgbClr val="000000">
-                <a:alpha val="35000"/>
-              </a:srgbClr>
-            </a:outerShdw>
-          </a:effectLst>
-          <a:scene3d>
-            <a:camera prst="orthographicFront">
-              <a:rot rev="0" lon="0" lat="0"/>
-            </a:camera>
-            <a:lightRig dir="t" rig="threePt">
-              <a:rot rev="1200000" lon="0" lat="0"/>
-            </a:lightRig>
-          </a:scene3d>
-          <a:sp3d>
-            <a:bevelT w="63500" h="25400"/>
-          </a:sp3d>
-        </a:effectStyle>
-      </a:effectStyleLst>
-      <a:bgFillStyleLst>
-        <a:solidFill>
-          <a:schemeClr val="phClr"/>
-        </a:solidFill>
-        <a:gradFill rotWithShape="1">
-          <a:gsLst>
-            <a:gs pos="0">
-              <a:schemeClr val="phClr">
-                <a:tint val="40000"/>
-                <a:satMod val="350000"/>
-              </a:schemeClr>
-            </a:gs>
-            <a:gs pos="40000">
-              <a:schemeClr val="phClr">
-                <a:tint val="45000"/>
-                <a:shade val="99000"/>
-                <a:satMod val="350000"/>
-              </a:schemeClr>
-            </a:gs>
-            <a:gs pos="100000">
-              <a:schemeClr val="phClr">
-                <a:shade val="20000"/>
-                <a:satMod val="255000"/>
-              </a:schemeClr>
-            </a:gs>
-          </a:gsLst>
-          <a:path path="circle">
-            <a:fillToRect t="-80000" b="180000" r="50000" l="50000"/>
-          </a:path>
-        </a:gradFill>
-        <a:gradFill rotWithShape="1">
-          <a:gsLst>
-            <a:gs pos="0">
-              <a:schemeClr val="phClr">
-                <a:tint val="80000"/>
-                <a:satMod val="300000"/>
-              </a:schemeClr>
-            </a:gs>
-            <a:gs pos="100000">
-              <a:schemeClr val="phClr">
-                <a:shade val="30000"/>
-                <a:satMod val="200000"/>
-              </a:schemeClr>
-            </a:gs>
-          </a:gsLst>
-          <a:path path="circle">
-            <a:fillToRect t="50000" b="50000" r="50000" l="50000"/>
-          </a:path>
-        </a:gradFill>
-      </a:bgFillStyleLst>
-    </a:fmtScheme>
-  </a:themeElements>
-</a:theme>
-</file>
-
-<file path=ppt/theme/theme2.xml><?xml version="1.0" encoding="utf-8"?>
 <a:theme xmlns:a="http://schemas.openxmlformats.org/drawingml/2006/main" xmlns:r="http://schemas.openxmlformats.org/officeDocument/2006/relationships" name="Office Theme">
   <a:themeElements>
     <a:clrScheme name="Office">
@@ -21746,7 +21492,7 @@
 </a:theme>
 </file>
 
-<file path=ppt/theme/theme3.xml><?xml version="1.0" encoding="utf-8"?>
+<file path=ppt/theme/theme2.xml><?xml version="1.0" encoding="utf-8"?>
 <a:theme xmlns:a="http://schemas.openxmlformats.org/drawingml/2006/main" xmlns:r="http://schemas.openxmlformats.org/officeDocument/2006/relationships">
   <a:themeElements>
     <a:clrScheme name="Default">
@@ -22021,4 +21767,281 @@
     </a:fmtScheme>
   </a:themeElements>
 </a:theme>
+</file>
+
+<file path=ppt/theme/theme3.xml><?xml version="1.0" encoding="utf-8"?>
+<a:theme xmlns:a="http://schemas.openxmlformats.org/drawingml/2006/main" xmlns:r="http://schemas.openxmlformats.org/officeDocument/2006/relationships">
+  <a:themeElements>
+    <a:clrScheme name="Office">
+      <a:dk1>
+        <a:srgbClr val="000000"/>
+      </a:dk1>
+      <a:lt1>
+        <a:srgbClr val="FFFFFF"/>
+      </a:lt1>
+      <a:dk2>
+        <a:srgbClr val="1F497D"/>
+      </a:dk2>
+      <a:lt2>
+        <a:srgbClr val="EEECE1"/>
+      </a:lt2>
+      <a:accent1>
+        <a:srgbClr val="4F81BD"/>
+      </a:accent1>
+      <a:accent2>
+        <a:srgbClr val="C0504D"/>
+      </a:accent2>
+      <a:accent3>
+        <a:srgbClr val="9BBB59"/>
+      </a:accent3>
+      <a:accent4>
+        <a:srgbClr val="8064A2"/>
+      </a:accent4>
+      <a:accent5>
+        <a:srgbClr val="4BACC6"/>
+      </a:accent5>
+      <a:accent6>
+        <a:srgbClr val="F79646"/>
+      </a:accent6>
+      <a:hlink>
+        <a:srgbClr val="0000FF"/>
+      </a:hlink>
+      <a:folHlink>
+        <a:srgbClr val="800080"/>
+      </a:folHlink>
+    </a:clrScheme>
+    <a:fontScheme name="Office">
+      <a:majorFont>
+        <a:latin typeface="Arial"/>
+        <a:ea typeface=""/>
+        <a:cs typeface=""/>
+        <a:font typeface="ＭＳ Ｐゴシック" script="Jpan"/>
+        <a:font typeface="맑은 고딕" script="Hang"/>
+        <a:font typeface="宋体" script="Hans"/>
+        <a:font typeface="新細明體" script="Hant"/>
+        <a:font typeface="Times New Roman" script="Arab"/>
+        <a:font typeface="Times New Roman" script="Hebr"/>
+        <a:font typeface="Angsana New" script="Thai"/>
+        <a:font typeface="Nyala" script="Ethi"/>
+        <a:font typeface="Vrinda" script="Beng"/>
+        <a:font typeface="Shruti" script="Gujr"/>
+        <a:font typeface="MoolBoran" script="Khmr"/>
+        <a:font typeface="Tunga" script="Knda"/>
+        <a:font typeface="Raavi" script="Guru"/>
+        <a:font typeface="Euphemia" script="Cans"/>
+        <a:font typeface="Plantagenet Cherokee" script="Cher"/>
+        <a:font typeface="Microsoft Yi Baiti" script="Yiii"/>
+        <a:font typeface="Microsoft Himalaya" script="Tibt"/>
+        <a:font typeface="MV Boli" script="Thaa"/>
+        <a:font typeface="Mangal" script="Deva"/>
+        <a:font typeface="Gautami" script="Telu"/>
+        <a:font typeface="Latha" script="Taml"/>
+        <a:font typeface="Estrangelo Edessa" script="Syrc"/>
+        <a:font typeface="Kalinga" script="Orya"/>
+        <a:font typeface="Kartika" script="Mlym"/>
+        <a:font typeface="DokChampa" script="Laoo"/>
+        <a:font typeface="Iskoola Pota" script="Sinh"/>
+        <a:font typeface="Mongolian Baiti" script="Mong"/>
+        <a:font typeface="Times New Roman" script="Viet"/>
+        <a:font typeface="Microsoft Uighur" script="Uigh"/>
+      </a:majorFont>
+      <a:minorFont>
+        <a:latin typeface="Arial"/>
+        <a:ea typeface=""/>
+        <a:cs typeface=""/>
+        <a:font typeface="ＭＳ Ｐゴシック" script="Jpan"/>
+        <a:font typeface="맑은 고딕" script="Hang"/>
+        <a:font typeface="宋体" script="Hans"/>
+        <a:font typeface="新細明體" script="Hant"/>
+        <a:font typeface="Arial" script="Arab"/>
+        <a:font typeface="Arial" script="Hebr"/>
+        <a:font typeface="Cordia New" script="Thai"/>
+        <a:font typeface="Nyala" script="Ethi"/>
+        <a:font typeface="Vrinda" script="Beng"/>
+        <a:font typeface="Shruti" script="Gujr"/>
+        <a:font typeface="DaunPenh" script="Khmr"/>
+        <a:font typeface="Tunga" script="Knda"/>
+        <a:font typeface="Raavi" script="Guru"/>
+        <a:font typeface="Euphemia" script="Cans"/>
+        <a:font typeface="Plantagenet Cherokee" script="Cher"/>
+        <a:font typeface="Microsoft Yi Baiti" script="Yiii"/>
+        <a:font typeface="Microsoft Himalaya" script="Tibt"/>
+        <a:font typeface="MV Boli" script="Thaa"/>
+        <a:font typeface="Mangal" script="Deva"/>
+        <a:font typeface="Gautami" script="Telu"/>
+        <a:font typeface="Latha" script="Taml"/>
+        <a:font typeface="Estrangelo Edessa" script="Syrc"/>
+        <a:font typeface="Kalinga" script="Orya"/>
+        <a:font typeface="Kartika" script="Mlym"/>
+        <a:font typeface="DokChampa" script="Laoo"/>
+        <a:font typeface="Iskoola Pota" script="Sinh"/>
+        <a:font typeface="Mongolian Baiti" script="Mong"/>
+        <a:font typeface="Arial" script="Viet"/>
+        <a:font typeface="Microsoft Uighur" script="Uigh"/>
+      </a:minorFont>
+    </a:fontScheme>
+    <a:fmtScheme name="Office">
+      <a:fillStyleLst>
+        <a:solidFill>
+          <a:schemeClr val="phClr"/>
+        </a:solidFill>
+        <a:gradFill rotWithShape="1">
+          <a:gsLst>
+            <a:gs pos="0">
+              <a:schemeClr val="phClr">
+                <a:tint val="50000"/>
+                <a:satMod val="300000"/>
+              </a:schemeClr>
+            </a:gs>
+            <a:gs pos="35000">
+              <a:schemeClr val="phClr">
+                <a:tint val="37000"/>
+                <a:satMod val="300000"/>
+              </a:schemeClr>
+            </a:gs>
+            <a:gs pos="100000">
+              <a:schemeClr val="phClr">
+                <a:tint val="15000"/>
+                <a:satMod val="350000"/>
+              </a:schemeClr>
+            </a:gs>
+          </a:gsLst>
+          <a:lin ang="16200000" scaled="1"/>
+        </a:gradFill>
+        <a:gradFill rotWithShape="1">
+          <a:gsLst>
+            <a:gs pos="0">
+              <a:schemeClr val="phClr">
+                <a:tint val="100000"/>
+                <a:shade val="100000"/>
+                <a:satMod val="130000"/>
+              </a:schemeClr>
+            </a:gs>
+            <a:gs pos="100000">
+              <a:schemeClr val="phClr">
+                <a:tint val="50000"/>
+                <a:shade val="100000"/>
+                <a:satMod val="350000"/>
+              </a:schemeClr>
+            </a:gs>
+          </a:gsLst>
+          <a:lin ang="16200000" scaled="0"/>
+        </a:gradFill>
+      </a:fillStyleLst>
+      <a:lnStyleLst>
+        <a:ln w="9525" algn="ctr" cap="flat" cmpd="sng">
+          <a:solidFill>
+            <a:schemeClr val="phClr">
+              <a:shade val="95000"/>
+              <a:satMod val="105000"/>
+            </a:schemeClr>
+          </a:solidFill>
+          <a:prstDash val="solid"/>
+        </a:ln>
+        <a:ln w="25400" algn="ctr" cap="flat" cmpd="sng">
+          <a:solidFill>
+            <a:schemeClr val="phClr"/>
+          </a:solidFill>
+          <a:prstDash val="solid"/>
+        </a:ln>
+        <a:ln w="38100" algn="ctr" cap="flat" cmpd="sng">
+          <a:solidFill>
+            <a:schemeClr val="phClr"/>
+          </a:solidFill>
+          <a:prstDash val="solid"/>
+        </a:ln>
+      </a:lnStyleLst>
+      <a:effectStyleLst>
+        <a:effectStyle>
+          <a:effectLst>
+            <a:outerShdw rotWithShape="0" dir="5400000" blurRad="40000" dist="20000">
+              <a:srgbClr val="000000">
+                <a:alpha val="38000"/>
+              </a:srgbClr>
+            </a:outerShdw>
+          </a:effectLst>
+        </a:effectStyle>
+        <a:effectStyle>
+          <a:effectLst>
+            <a:outerShdw rotWithShape="0" dir="5400000" blurRad="40000" dist="23000">
+              <a:srgbClr val="000000">
+                <a:alpha val="35000"/>
+              </a:srgbClr>
+            </a:outerShdw>
+          </a:effectLst>
+        </a:effectStyle>
+        <a:effectStyle>
+          <a:effectLst>
+            <a:outerShdw rotWithShape="0" dir="5400000" blurRad="40000" dist="23000">
+              <a:srgbClr val="000000">
+                <a:alpha val="35000"/>
+              </a:srgbClr>
+            </a:outerShdw>
+          </a:effectLst>
+          <a:scene3d>
+            <a:camera prst="orthographicFront">
+              <a:rot rev="0" lon="0" lat="0"/>
+            </a:camera>
+            <a:lightRig dir="t" rig="threePt">
+              <a:rot rev="1200000" lon="0" lat="0"/>
+            </a:lightRig>
+          </a:scene3d>
+          <a:sp3d>
+            <a:bevelT w="63500" h="25400"/>
+          </a:sp3d>
+        </a:effectStyle>
+      </a:effectStyleLst>
+      <a:bgFillStyleLst>
+        <a:solidFill>
+          <a:schemeClr val="phClr"/>
+        </a:solidFill>
+        <a:gradFill rotWithShape="1">
+          <a:gsLst>
+            <a:gs pos="0">
+              <a:schemeClr val="phClr">
+                <a:tint val="40000"/>
+                <a:satMod val="350000"/>
+              </a:schemeClr>
+            </a:gs>
+            <a:gs pos="40000">
+              <a:schemeClr val="phClr">
+                <a:tint val="45000"/>
+                <a:shade val="99000"/>
+                <a:satMod val="350000"/>
+              </a:schemeClr>
+            </a:gs>
+            <a:gs pos="100000">
+              <a:schemeClr val="phClr">
+                <a:shade val="20000"/>
+                <a:satMod val="255000"/>
+              </a:schemeClr>
+            </a:gs>
+          </a:gsLst>
+          <a:path path="circle">
+            <a:fillToRect t="-80000" b="180000" r="50000" l="50000"/>
+          </a:path>
+        </a:gradFill>
+        <a:gradFill rotWithShape="1">
+          <a:gsLst>
+            <a:gs pos="0">
+              <a:schemeClr val="phClr">
+                <a:tint val="80000"/>
+                <a:satMod val="300000"/>
+              </a:schemeClr>
+            </a:gs>
+            <a:gs pos="100000">
+              <a:schemeClr val="phClr">
+                <a:shade val="30000"/>
+                <a:satMod val="200000"/>
+              </a:schemeClr>
+            </a:gs>
+          </a:gsLst>
+          <a:path path="circle">
+            <a:fillToRect t="50000" b="50000" r="50000" l="50000"/>
+          </a:path>
+        </a:gradFill>
+      </a:bgFillStyleLst>
+    </a:fmtScheme>
+  </a:themeElements>
+</a:theme>
 </file>
</xml_diff>